<commit_message>
aggiunta slide architettura di sistema
</commit_message>
<xml_diff>
--- a/tesi/presentazione/template laurea-43.pptx
+++ b/tesi/presentazione/template laurea-43.pptx
@@ -5,7 +5,7 @@
     <p:sldMasterId id="2147483660" r:id="rId1"/>
   </p:sldMasterIdLst>
   <p:notesMasterIdLst>
-    <p:notesMasterId r:id="rId13"/>
+    <p:notesMasterId r:id="rId14"/>
   </p:notesMasterIdLst>
   <p:sldIdLst>
     <p:sldId id="256" r:id="rId2"/>
@@ -19,6 +19,7 @@
     <p:sldId id="264" r:id="rId10"/>
     <p:sldId id="265" r:id="rId11"/>
     <p:sldId id="266" r:id="rId12"/>
+    <p:sldId id="267" r:id="rId13"/>
   </p:sldIdLst>
   <p:sldSz cx="9144000" cy="6858000" type="screen4x3"/>
   <p:notesSz cx="6858000" cy="9144000"/>
@@ -218,7 +219,7 @@
           <a:p>
             <a:fld id="{B8FD74C9-97B2-40A2-A045-D98EF1CCDAB4}" type="datetimeFigureOut">
               <a:rPr lang="it-IT" smtClean="0"/>
-              <a:t>12/09/2015</a:t>
+              <a:t>13/09/2015</a:t>
             </a:fld>
             <a:endParaRPr lang="it-IT"/>
           </a:p>
@@ -513,12 +514,7 @@
             <p:ph type="sldImg"/>
           </p:nvPr>
         </p:nvSpPr>
-        <p:spPr>
-          <a:xfrm>
-            <a:off x="1371600" y="1143000"/>
-            <a:ext cx="4114800" cy="3086100"/>
-          </a:xfrm>
-        </p:spPr>
+        <p:spPr/>
       </p:sp>
       <p:sp>
         <p:nvSpPr>
@@ -535,255 +531,7 @@
           <a:bodyPr/>
           <a:lstStyle/>
           <a:p>
-            <a:r>
-              <a:rPr lang="it-IT" sz="1800" b="0" i="0" u="none" strike="noStrike" kern="1200" baseline="0" dirty="0" smtClean="0">
-                <a:solidFill>
-                  <a:schemeClr val="tx1"/>
-                </a:solidFill>
-                <a:latin typeface="+mn-lt"/>
-                <a:ea typeface="+mn-ea"/>
-                <a:cs typeface="+mn-cs"/>
-              </a:rPr>
-              <a:t>Il progetto 3D4Amb sfrutta la tecnologia 3D </a:t>
-            </a:r>
-            <a:r>
-              <a:rPr lang="it-IT" sz="1800" b="0" i="0" u="none" strike="noStrike" kern="1200" baseline="0" dirty="0" err="1" smtClean="0">
-                <a:solidFill>
-                  <a:schemeClr val="tx1"/>
-                </a:solidFill>
-                <a:latin typeface="+mn-lt"/>
-                <a:ea typeface="+mn-ea"/>
-                <a:cs typeface="+mn-cs"/>
-              </a:rPr>
-              <a:t>active</a:t>
-            </a:r>
-            <a:r>
-              <a:rPr lang="it-IT" sz="1800" b="0" i="0" u="none" strike="noStrike" kern="1200" baseline="0" dirty="0" smtClean="0">
-                <a:solidFill>
-                  <a:schemeClr val="tx1"/>
-                </a:solidFill>
-                <a:latin typeface="+mn-lt"/>
-                <a:ea typeface="+mn-ea"/>
-                <a:cs typeface="+mn-cs"/>
-              </a:rPr>
-              <a:t> </a:t>
-            </a:r>
-            <a:r>
-              <a:rPr lang="it-IT" sz="1800" b="0" i="0" u="none" strike="noStrike" kern="1200" baseline="0" dirty="0" err="1" smtClean="0">
-                <a:solidFill>
-                  <a:schemeClr val="tx1"/>
-                </a:solidFill>
-                <a:latin typeface="+mn-lt"/>
-                <a:ea typeface="+mn-ea"/>
-                <a:cs typeface="+mn-cs"/>
-              </a:rPr>
-              <a:t>shutter</a:t>
-            </a:r>
-            <a:r>
-              <a:rPr lang="it-IT" sz="1800" b="0" i="0" u="none" strike="noStrike" kern="1200" baseline="0" dirty="0" smtClean="0">
-                <a:solidFill>
-                  <a:schemeClr val="tx1"/>
-                </a:solidFill>
-                <a:latin typeface="+mn-lt"/>
-                <a:ea typeface="+mn-ea"/>
-                <a:cs typeface="+mn-cs"/>
-              </a:rPr>
-              <a:t> per garantire una visione</a:t>
-            </a:r>
-          </a:p>
-          <a:p>
-            <a:r>
-              <a:rPr lang="it-IT" sz="1800" b="0" i="0" u="none" strike="noStrike" kern="1200" baseline="0" dirty="0" smtClean="0">
-                <a:solidFill>
-                  <a:schemeClr val="tx1"/>
-                </a:solidFill>
-                <a:latin typeface="+mn-lt"/>
-                <a:ea typeface="+mn-ea"/>
-                <a:cs typeface="+mn-cs"/>
-              </a:rPr>
-              <a:t>binoculare, cioè per mostrare immagini diverse all'occhio normale e all'occhio</a:t>
-            </a:r>
-          </a:p>
-          <a:p>
-            <a:r>
-              <a:rPr lang="it-IT" sz="1800" b="0" i="0" u="none" strike="noStrike" kern="1200" baseline="0" dirty="0" smtClean="0">
-                <a:solidFill>
-                  <a:schemeClr val="tx1"/>
-                </a:solidFill>
-                <a:latin typeface="+mn-lt"/>
-                <a:ea typeface="+mn-ea"/>
-                <a:cs typeface="+mn-cs"/>
-              </a:rPr>
-              <a:t>pigro. Il progetto punta a sviluppare una tecnologia per consentire una facile diagnosi</a:t>
-            </a:r>
-          </a:p>
-          <a:p>
-            <a:r>
-              <a:rPr lang="it-IT" sz="1800" b="0" i="0" u="none" strike="noStrike" kern="1200" baseline="0" dirty="0" smtClean="0">
-                <a:solidFill>
-                  <a:schemeClr val="tx1"/>
-                </a:solidFill>
-                <a:latin typeface="+mn-lt"/>
-                <a:ea typeface="+mn-ea"/>
-                <a:cs typeface="+mn-cs"/>
-              </a:rPr>
-              <a:t>dell'ambliopia e il suo trattamento per mezzo di giochi interattivi e attività di</a:t>
-            </a:r>
-          </a:p>
-          <a:p>
-            <a:r>
-              <a:rPr lang="it-IT" sz="1800" b="0" i="0" u="none" strike="noStrike" kern="1200" baseline="0" dirty="0" err="1" smtClean="0">
-                <a:solidFill>
-                  <a:schemeClr val="tx1"/>
-                </a:solidFill>
-                <a:latin typeface="+mn-lt"/>
-                <a:ea typeface="+mn-ea"/>
-                <a:cs typeface="+mn-cs"/>
-              </a:rPr>
-              <a:t>intrattenimento.La</a:t>
-            </a:r>
-            <a:r>
-              <a:rPr lang="it-IT" sz="1800" b="0" i="0" u="none" strike="noStrike" kern="1200" baseline="0" dirty="0" smtClean="0">
-                <a:solidFill>
-                  <a:schemeClr val="tx1"/>
-                </a:solidFill>
-                <a:latin typeface="+mn-lt"/>
-                <a:ea typeface="+mn-ea"/>
-                <a:cs typeface="+mn-cs"/>
-              </a:rPr>
-              <a:t> soluzione proposta mira ad eliminare i problemi del trattamento</a:t>
-            </a:r>
-          </a:p>
-          <a:p>
-            <a:r>
-              <a:rPr lang="it-IT" sz="1800" b="0" i="0" u="none" strike="noStrike" kern="1200" baseline="0" dirty="0" smtClean="0">
-                <a:solidFill>
-                  <a:schemeClr val="tx1"/>
-                </a:solidFill>
-                <a:latin typeface="+mn-lt"/>
-                <a:ea typeface="+mn-ea"/>
-                <a:cs typeface="+mn-cs"/>
-              </a:rPr>
-              <a:t>classico dell'occlusione, è adatto ad un uso domestico, e potrebbe, almeno in parte,</a:t>
-            </a:r>
-          </a:p>
-          <a:p>
-            <a:r>
-              <a:rPr lang="it-IT" sz="1800" b="0" i="0" u="none" strike="noStrike" kern="1200" baseline="0" dirty="0" smtClean="0">
-                <a:solidFill>
-                  <a:schemeClr val="tx1"/>
-                </a:solidFill>
-                <a:latin typeface="+mn-lt"/>
-                <a:ea typeface="+mn-ea"/>
-                <a:cs typeface="+mn-cs"/>
-              </a:rPr>
-              <a:t>sostituire l'occlusione dell'occhio normale.</a:t>
-            </a:r>
-          </a:p>
-          <a:p>
-            <a:endParaRPr lang="it-IT" sz="1800" b="0" i="0" u="none" strike="noStrike" kern="1200" baseline="0" dirty="0" smtClean="0">
-              <a:solidFill>
-                <a:schemeClr val="tx1"/>
-              </a:solidFill>
-              <a:latin typeface="+mn-lt"/>
-              <a:ea typeface="+mn-ea"/>
-              <a:cs typeface="+mn-cs"/>
-            </a:endParaRPr>
-          </a:p>
-          <a:p>
-            <a:r>
-              <a:rPr lang="it-IT" sz="1800" b="0" i="0" u="none" strike="noStrike" kern="1200" baseline="0" dirty="0" smtClean="0">
-                <a:solidFill>
-                  <a:schemeClr val="tx1"/>
-                </a:solidFill>
-                <a:latin typeface="+mn-lt"/>
-                <a:ea typeface="+mn-ea"/>
-                <a:cs typeface="+mn-cs"/>
-              </a:rPr>
-              <a:t>L'obiettivo principale di questo progetto di ricerca, denominato 3D4Amb, è di sviluppare</a:t>
-            </a:r>
-          </a:p>
-          <a:p>
-            <a:r>
-              <a:rPr lang="it-IT" sz="1800" b="0" i="0" u="none" strike="noStrike" kern="1200" baseline="0" dirty="0" smtClean="0">
-                <a:solidFill>
-                  <a:schemeClr val="tx1"/>
-                </a:solidFill>
-                <a:latin typeface="+mn-lt"/>
-                <a:ea typeface="+mn-ea"/>
-                <a:cs typeface="+mn-cs"/>
-              </a:rPr>
-              <a:t>un sistema per la diagnosi e il trattamento di ambliopia, basata sulla visione</a:t>
-            </a:r>
-          </a:p>
-          <a:p>
-            <a:r>
-              <a:rPr lang="it-IT" sz="1800" b="0" i="0" u="none" strike="noStrike" kern="1200" baseline="0" dirty="0" smtClean="0">
-                <a:solidFill>
-                  <a:schemeClr val="tx1"/>
-                </a:solidFill>
-                <a:latin typeface="+mn-lt"/>
-                <a:ea typeface="+mn-ea"/>
-                <a:cs typeface="+mn-cs"/>
-              </a:rPr>
-              <a:t>binoculare in modo accessibile. Con il termine accessibile si intende: poco costoso,</a:t>
-            </a:r>
-          </a:p>
-          <a:p>
-            <a:r>
-              <a:rPr lang="it-IT" sz="1800" b="0" i="0" u="none" strike="noStrike" kern="1200" baseline="0" dirty="0" err="1" smtClean="0">
-                <a:solidFill>
-                  <a:schemeClr val="tx1"/>
-                </a:solidFill>
-                <a:latin typeface="+mn-lt"/>
-                <a:ea typeface="+mn-ea"/>
-                <a:cs typeface="+mn-cs"/>
-              </a:rPr>
-              <a:t>user</a:t>
-            </a:r>
-            <a:r>
-              <a:rPr lang="it-IT" sz="1800" b="0" i="0" u="none" strike="noStrike" kern="1200" baseline="0" dirty="0" smtClean="0">
-                <a:solidFill>
-                  <a:schemeClr val="tx1"/>
-                </a:solidFill>
-                <a:latin typeface="+mn-lt"/>
-                <a:ea typeface="+mn-ea"/>
-                <a:cs typeface="+mn-cs"/>
-              </a:rPr>
-              <a:t> </a:t>
-            </a:r>
-            <a:r>
-              <a:rPr lang="it-IT" sz="1800" b="0" i="0" u="none" strike="noStrike" kern="1200" baseline="0" dirty="0" err="1" smtClean="0">
-                <a:solidFill>
-                  <a:schemeClr val="tx1"/>
-                </a:solidFill>
-                <a:latin typeface="+mn-lt"/>
-                <a:ea typeface="+mn-ea"/>
-                <a:cs typeface="+mn-cs"/>
-              </a:rPr>
-              <a:t>friendly</a:t>
-            </a:r>
-            <a:r>
-              <a:rPr lang="it-IT" sz="1800" b="0" i="0" u="none" strike="noStrike" kern="1200" baseline="0" dirty="0" smtClean="0">
-                <a:solidFill>
-                  <a:schemeClr val="tx1"/>
-                </a:solidFill>
-                <a:latin typeface="+mn-lt"/>
-                <a:ea typeface="+mn-ea"/>
-                <a:cs typeface="+mn-cs"/>
-              </a:rPr>
-              <a:t>, adatto per uso domestico e facilmente estendibile.</a:t>
-            </a:r>
-          </a:p>
-          <a:p>
-            <a:endParaRPr lang="it-IT" sz="1800" b="0" i="0" u="none" strike="noStrike" kern="1200" baseline="0" dirty="0" smtClean="0">
-              <a:solidFill>
-                <a:schemeClr val="tx1"/>
-              </a:solidFill>
-              <a:latin typeface="+mn-lt"/>
-              <a:ea typeface="+mn-ea"/>
-              <a:cs typeface="+mn-cs"/>
-            </a:endParaRPr>
+            <a:endParaRPr lang="it-IT" dirty="0"/>
           </a:p>
         </p:txBody>
       </p:sp>
@@ -804,7 +552,7 @@
           <a:p>
             <a:fld id="{CFA2E487-D896-4E0E-8AAE-B7DEF5C7D479}" type="slidenum">
               <a:rPr lang="it-IT" smtClean="0"/>
-              <a:t>2</a:t>
+              <a:t>1</a:t>
             </a:fld>
             <a:endParaRPr lang="it-IT"/>
           </a:p>
@@ -813,7 +561,7 @@
     </p:spTree>
     <p:extLst>
       <p:ext uri="{BB962C8B-B14F-4D97-AF65-F5344CB8AC3E}">
-        <p14:creationId xmlns:p14="http://schemas.microsoft.com/office/powerpoint/2010/main" val="2470202936"/>
+        <p14:creationId xmlns:p14="http://schemas.microsoft.com/office/powerpoint/2010/main" val="3882234628"/>
       </p:ext>
     </p:extLst>
   </p:cSld>
@@ -900,6 +648,102 @@
           <a:p>
             <a:fld id="{CFA2E487-D896-4E0E-8AAE-B7DEF5C7D479}" type="slidenum">
               <a:rPr lang="it-IT" smtClean="0"/>
+              <a:t>10</a:t>
+            </a:fld>
+            <a:endParaRPr lang="it-IT"/>
+          </a:p>
+        </p:txBody>
+      </p:sp>
+    </p:spTree>
+    <p:extLst>
+      <p:ext uri="{BB962C8B-B14F-4D97-AF65-F5344CB8AC3E}">
+        <p14:creationId xmlns:p14="http://schemas.microsoft.com/office/powerpoint/2010/main" val="2705236575"/>
+      </p:ext>
+    </p:extLst>
+  </p:cSld>
+  <p:clrMapOvr>
+    <a:masterClrMapping/>
+  </p:clrMapOvr>
+</p:notes>
+</file>
+
+<file path=ppt/notesSlides/notesSlide11.xml><?xml version="1.0" encoding="utf-8"?>
+<p:notes xmlns:a="http://schemas.openxmlformats.org/drawingml/2006/main" xmlns:r="http://schemas.openxmlformats.org/officeDocument/2006/relationships" xmlns:p="http://schemas.openxmlformats.org/presentationml/2006/main">
+  <p:cSld>
+    <p:spTree>
+      <p:nvGrpSpPr>
+        <p:cNvPr id="1" name=""/>
+        <p:cNvGrpSpPr/>
+        <p:nvPr/>
+      </p:nvGrpSpPr>
+      <p:grpSpPr>
+        <a:xfrm>
+          <a:off x="0" y="0"/>
+          <a:ext cx="0" cy="0"/>
+          <a:chOff x="0" y="0"/>
+          <a:chExt cx="0" cy="0"/>
+        </a:xfrm>
+      </p:grpSpPr>
+      <p:sp>
+        <p:nvSpPr>
+          <p:cNvPr id="2" name="Segnaposto immagine diapositiva 1"/>
+          <p:cNvSpPr>
+            <a:spLocks noGrp="1" noRot="1" noChangeAspect="1"/>
+          </p:cNvSpPr>
+          <p:nvPr>
+            <p:ph type="sldImg"/>
+          </p:nvPr>
+        </p:nvSpPr>
+        <p:spPr>
+          <a:xfrm>
+            <a:off x="1371600" y="1143000"/>
+            <a:ext cx="4114800" cy="3086100"/>
+          </a:xfrm>
+        </p:spPr>
+      </p:sp>
+      <p:sp>
+        <p:nvSpPr>
+          <p:cNvPr id="3" name="Segnaposto note 2"/>
+          <p:cNvSpPr>
+            <a:spLocks noGrp="1"/>
+          </p:cNvSpPr>
+          <p:nvPr>
+            <p:ph type="body" idx="1"/>
+          </p:nvPr>
+        </p:nvSpPr>
+        <p:spPr/>
+        <p:txBody>
+          <a:bodyPr/>
+          <a:lstStyle/>
+          <a:p>
+            <a:endParaRPr lang="it-IT" sz="1800" b="0" i="0" u="none" strike="noStrike" kern="1200" baseline="0" dirty="0" smtClean="0">
+              <a:solidFill>
+                <a:schemeClr val="tx1"/>
+              </a:solidFill>
+              <a:latin typeface="+mn-lt"/>
+              <a:ea typeface="+mn-ea"/>
+              <a:cs typeface="+mn-cs"/>
+            </a:endParaRPr>
+          </a:p>
+        </p:txBody>
+      </p:sp>
+      <p:sp>
+        <p:nvSpPr>
+          <p:cNvPr id="4" name="Segnaposto numero diapositiva 3"/>
+          <p:cNvSpPr>
+            <a:spLocks noGrp="1"/>
+          </p:cNvSpPr>
+          <p:nvPr>
+            <p:ph type="sldNum" sz="quarter" idx="10"/>
+          </p:nvPr>
+        </p:nvSpPr>
+        <p:spPr/>
+        <p:txBody>
+          <a:bodyPr/>
+          <a:lstStyle/>
+          <a:p>
+            <a:fld id="{CFA2E487-D896-4E0E-8AAE-B7DEF5C7D479}" type="slidenum">
+              <a:rPr lang="it-IT" smtClean="0"/>
               <a:t>11</a:t>
             </a:fld>
             <a:endParaRPr lang="it-IT"/>
@@ -910,6 +754,102 @@
     <p:extLst>
       <p:ext uri="{BB962C8B-B14F-4D97-AF65-F5344CB8AC3E}">
         <p14:creationId xmlns:p14="http://schemas.microsoft.com/office/powerpoint/2010/main" val="3630367670"/>
+      </p:ext>
+    </p:extLst>
+  </p:cSld>
+  <p:clrMapOvr>
+    <a:masterClrMapping/>
+  </p:clrMapOvr>
+</p:notes>
+</file>
+
+<file path=ppt/notesSlides/notesSlide12.xml><?xml version="1.0" encoding="utf-8"?>
+<p:notes xmlns:a="http://schemas.openxmlformats.org/drawingml/2006/main" xmlns:r="http://schemas.openxmlformats.org/officeDocument/2006/relationships" xmlns:p="http://schemas.openxmlformats.org/presentationml/2006/main">
+  <p:cSld>
+    <p:spTree>
+      <p:nvGrpSpPr>
+        <p:cNvPr id="1" name=""/>
+        <p:cNvGrpSpPr/>
+        <p:nvPr/>
+      </p:nvGrpSpPr>
+      <p:grpSpPr>
+        <a:xfrm>
+          <a:off x="0" y="0"/>
+          <a:ext cx="0" cy="0"/>
+          <a:chOff x="0" y="0"/>
+          <a:chExt cx="0" cy="0"/>
+        </a:xfrm>
+      </p:grpSpPr>
+      <p:sp>
+        <p:nvSpPr>
+          <p:cNvPr id="2" name="Segnaposto immagine diapositiva 1"/>
+          <p:cNvSpPr>
+            <a:spLocks noGrp="1" noRot="1" noChangeAspect="1"/>
+          </p:cNvSpPr>
+          <p:nvPr>
+            <p:ph type="sldImg"/>
+          </p:nvPr>
+        </p:nvSpPr>
+        <p:spPr>
+          <a:xfrm>
+            <a:off x="1371600" y="1143000"/>
+            <a:ext cx="4114800" cy="3086100"/>
+          </a:xfrm>
+        </p:spPr>
+      </p:sp>
+      <p:sp>
+        <p:nvSpPr>
+          <p:cNvPr id="3" name="Segnaposto note 2"/>
+          <p:cNvSpPr>
+            <a:spLocks noGrp="1"/>
+          </p:cNvSpPr>
+          <p:nvPr>
+            <p:ph type="body" idx="1"/>
+          </p:nvPr>
+        </p:nvSpPr>
+        <p:spPr/>
+        <p:txBody>
+          <a:bodyPr/>
+          <a:lstStyle/>
+          <a:p>
+            <a:endParaRPr lang="it-IT" sz="1800" b="0" i="0" u="none" strike="noStrike" kern="1200" baseline="0" dirty="0" smtClean="0">
+              <a:solidFill>
+                <a:schemeClr val="tx1"/>
+              </a:solidFill>
+              <a:latin typeface="+mn-lt"/>
+              <a:ea typeface="+mn-ea"/>
+              <a:cs typeface="+mn-cs"/>
+            </a:endParaRPr>
+          </a:p>
+        </p:txBody>
+      </p:sp>
+      <p:sp>
+        <p:nvSpPr>
+          <p:cNvPr id="4" name="Segnaposto numero diapositiva 3"/>
+          <p:cNvSpPr>
+            <a:spLocks noGrp="1"/>
+          </p:cNvSpPr>
+          <p:nvPr>
+            <p:ph type="sldNum" sz="quarter" idx="10"/>
+          </p:nvPr>
+        </p:nvSpPr>
+        <p:spPr/>
+        <p:txBody>
+          <a:bodyPr/>
+          <a:lstStyle/>
+          <a:p>
+            <a:fld id="{CFA2E487-D896-4E0E-8AAE-B7DEF5C7D479}" type="slidenum">
+              <a:rPr lang="it-IT" smtClean="0"/>
+              <a:t>12</a:t>
+            </a:fld>
+            <a:endParaRPr lang="it-IT"/>
+          </a:p>
+        </p:txBody>
+      </p:sp>
+    </p:spTree>
+    <p:extLst>
+      <p:ext uri="{BB962C8B-B14F-4D97-AF65-F5344CB8AC3E}">
+        <p14:creationId xmlns:p14="http://schemas.microsoft.com/office/powerpoint/2010/main" val="242437447"/>
       </p:ext>
     </p:extLst>
   </p:cSld>
@@ -1237,7 +1177,7 @@
           <a:p>
             <a:fld id="{CFA2E487-D896-4E0E-8AAE-B7DEF5C7D479}" type="slidenum">
               <a:rPr lang="it-IT" smtClean="0"/>
-              <a:t>3</a:t>
+              <a:t>2</a:t>
             </a:fld>
             <a:endParaRPr lang="it-IT"/>
           </a:p>
@@ -1246,7 +1186,7 @@
     </p:spTree>
     <p:extLst>
       <p:ext uri="{BB962C8B-B14F-4D97-AF65-F5344CB8AC3E}">
-        <p14:creationId xmlns:p14="http://schemas.microsoft.com/office/powerpoint/2010/main" val="4114793006"/>
+        <p14:creationId xmlns:p14="http://schemas.microsoft.com/office/powerpoint/2010/main" val="2470202936"/>
       </p:ext>
     </p:extLst>
   </p:cSld>
@@ -1306,7 +1246,7 @@
           <a:lstStyle/>
           <a:p>
             <a:r>
-              <a:rPr lang="it-IT" sz="1200" b="0" i="0" u="none" strike="noStrike" kern="1200" baseline="0" dirty="0" smtClean="0">
+              <a:rPr lang="it-IT" sz="1800" b="0" i="0" u="none" strike="noStrike" kern="1200" baseline="0" dirty="0" smtClean="0">
                 <a:solidFill>
                   <a:schemeClr val="tx1"/>
                 </a:solidFill>
@@ -1314,12 +1254,10 @@
                 <a:ea typeface="+mn-ea"/>
                 <a:cs typeface="+mn-cs"/>
               </a:rPr>
-              <a:t>le immagini che provengono dagli occhi non vengono correttamente rielaborate all'interno</a:t>
-            </a:r>
-          </a:p>
-          <a:p>
-            <a:r>
-              <a:rPr lang="it-IT" sz="1200" b="0" i="0" u="none" strike="noStrike" kern="1200" baseline="0" dirty="0" smtClean="0">
+              <a:t>Il progetto 3D4Amb sfrutta la tecnologia 3D </a:t>
+            </a:r>
+            <a:r>
+              <a:rPr lang="it-IT" sz="1800" b="0" i="0" u="none" strike="noStrike" kern="1200" baseline="0" dirty="0" err="1" smtClean="0">
                 <a:solidFill>
                   <a:schemeClr val="tx1"/>
                 </a:solidFill>
@@ -1327,12 +1265,10 @@
                 <a:ea typeface="+mn-ea"/>
                 <a:cs typeface="+mn-cs"/>
               </a:rPr>
-              <a:t>del cervello. Questo causa una scorretta comprensione dello spazio che</a:t>
-            </a:r>
-          </a:p>
-          <a:p>
-            <a:r>
-              <a:rPr lang="it-IT" sz="1200" b="0" i="0" u="none" strike="noStrike" kern="1200" baseline="0" dirty="0" smtClean="0">
+              <a:t>active</a:t>
+            </a:r>
+            <a:r>
+              <a:rPr lang="it-IT" sz="1800" b="0" i="0" u="none" strike="noStrike" kern="1200" baseline="0" dirty="0" smtClean="0">
                 <a:solidFill>
                   <a:schemeClr val="tx1"/>
                 </a:solidFill>
@@ -1340,12 +1276,10 @@
                 <a:ea typeface="+mn-ea"/>
                 <a:cs typeface="+mn-cs"/>
               </a:rPr>
-              <a:t>lo circonda e causa una percezione scorretta della profondità, dei movimenti e dei</a:t>
-            </a:r>
-          </a:p>
-          <a:p>
-            <a:r>
-              <a:rPr lang="it-IT" sz="1200" b="0" i="0" u="none" strike="noStrike" kern="1200" baseline="0" dirty="0" smtClean="0">
+              <a:t> </a:t>
+            </a:r>
+            <a:r>
+              <a:rPr lang="it-IT" sz="1800" b="0" i="0" u="none" strike="noStrike" kern="1200" baseline="0" dirty="0" err="1" smtClean="0">
                 <a:solidFill>
                   <a:schemeClr val="tx1"/>
                 </a:solidFill>
@@ -1353,12 +1287,10 @@
                 <a:ea typeface="+mn-ea"/>
                 <a:cs typeface="+mn-cs"/>
               </a:rPr>
-              <a:t>contrasti. È presente nel 2-4% della popolazione, la sua incidenza è più elevata in</a:t>
-            </a:r>
-          </a:p>
-          <a:p>
-            <a:r>
-              <a:rPr lang="it-IT" sz="1200" b="0" i="0" u="none" strike="noStrike" kern="1200" baseline="0" dirty="0" smtClean="0">
+              <a:t>shutter</a:t>
+            </a:r>
+            <a:r>
+              <a:rPr lang="it-IT" sz="1800" b="0" i="0" u="none" strike="noStrike" kern="1200" baseline="0" dirty="0" smtClean="0">
                 <a:solidFill>
                   <a:schemeClr val="tx1"/>
                 </a:solidFill>
@@ -1366,12 +1298,12 @@
                 <a:ea typeface="+mn-ea"/>
                 <a:cs typeface="+mn-cs"/>
               </a:rPr>
-              <a:t>associazione con alcune condizioni quali prematurità, sindrome di Down, patologia</a:t>
-            </a:r>
-          </a:p>
-          <a:p>
-            <a:r>
-              <a:rPr lang="it-IT" sz="1200" b="0" i="0" u="none" strike="noStrike" kern="1200" baseline="0" dirty="0" smtClean="0">
+              <a:t> per garantire una visione</a:t>
+            </a:r>
+          </a:p>
+          <a:p>
+            <a:r>
+              <a:rPr lang="it-IT" sz="1800" b="0" i="0" u="none" strike="noStrike" kern="1200" baseline="0" dirty="0" smtClean="0">
                 <a:solidFill>
                   <a:schemeClr val="tx1"/>
                 </a:solidFill>
@@ -1379,12 +1311,12 @@
                 <a:ea typeface="+mn-ea"/>
                 <a:cs typeface="+mn-cs"/>
               </a:rPr>
-              <a:t>neurologica e familiarità per ambliopia o strabismo. Spesso le persone non si accorgono</a:t>
-            </a:r>
-          </a:p>
-          <a:p>
-            <a:r>
-              <a:rPr lang="it-IT" sz="1200" b="0" i="0" u="none" strike="noStrike" kern="1200" baseline="0" dirty="0" smtClean="0">
+              <a:t>binoculare, cioè per mostrare immagini diverse all'occhio normale e all'occhio</a:t>
+            </a:r>
+          </a:p>
+          <a:p>
+            <a:r>
+              <a:rPr lang="it-IT" sz="1800" b="0" i="0" u="none" strike="noStrike" kern="1200" baseline="0" dirty="0" smtClean="0">
                 <a:solidFill>
                   <a:schemeClr val="tx1"/>
                 </a:solidFill>
@@ -1392,10 +1324,12 @@
                 <a:ea typeface="+mn-ea"/>
                 <a:cs typeface="+mn-cs"/>
               </a:rPr>
-              <a:t>di esserne </a:t>
-            </a:r>
-            <a:r>
-              <a:rPr lang="it-IT" sz="1200" b="0" i="0" u="none" strike="noStrike" kern="1200" baseline="0" dirty="0" err="1" smtClean="0">
+              <a:t>pigro. Il progetto punta a sviluppare una tecnologia per consentire una facile diagnosi</a:t>
+            </a:r>
+          </a:p>
+          <a:p>
+            <a:r>
+              <a:rPr lang="it-IT" sz="1800" b="0" i="0" u="none" strike="noStrike" kern="1200" baseline="0" dirty="0" smtClean="0">
                 <a:solidFill>
                   <a:schemeClr val="tx1"/>
                 </a:solidFill>
@@ -1403,10 +1337,12 @@
                 <a:ea typeface="+mn-ea"/>
                 <a:cs typeface="+mn-cs"/>
               </a:rPr>
-              <a:t>aette</a:t>
-            </a:r>
-            <a:r>
-              <a:rPr lang="it-IT" sz="1200" b="0" i="0" u="none" strike="noStrike" kern="1200" baseline="0" dirty="0" smtClean="0">
+              <a:t>dell'ambliopia e il suo trattamento per mezzo di giochi interattivi e attività di</a:t>
+            </a:r>
+          </a:p>
+          <a:p>
+            <a:r>
+              <a:rPr lang="it-IT" sz="1800" b="0" i="0" u="none" strike="noStrike" kern="1200" baseline="0" dirty="0" err="1" smtClean="0">
                 <a:solidFill>
                   <a:schemeClr val="tx1"/>
                 </a:solidFill>
@@ -1414,12 +1350,10 @@
                 <a:ea typeface="+mn-ea"/>
                 <a:cs typeface="+mn-cs"/>
               </a:rPr>
-              <a:t> no ai 20-30 anni, per questo è fondamentale la diagnosi.</a:t>
-            </a:r>
-          </a:p>
-          <a:p>
-            <a:r>
-              <a:rPr lang="it-IT" sz="1200" b="0" i="0" u="none" strike="noStrike" kern="1200" baseline="0" dirty="0" smtClean="0">
+              <a:t>intrattenimento.La</a:t>
+            </a:r>
+            <a:r>
+              <a:rPr lang="it-IT" sz="1800" b="0" i="0" u="none" strike="noStrike" kern="1200" baseline="0" dirty="0" smtClean="0">
                 <a:solidFill>
                   <a:schemeClr val="tx1"/>
                 </a:solidFill>
@@ -1427,12 +1361,12 @@
                 <a:ea typeface="+mn-ea"/>
                 <a:cs typeface="+mn-cs"/>
               </a:rPr>
-              <a:t>Può colpire i bambini dalla nascita no ai 7 anni, età in cui il sistema visivo raggiunge</a:t>
-            </a:r>
-          </a:p>
-          <a:p>
-            <a:r>
-              <a:rPr lang="it-IT" sz="1200" b="0" i="0" u="none" strike="noStrike" kern="1200" baseline="0" dirty="0" smtClean="0">
+              <a:t> soluzione proposta mira ad eliminare i problemi del trattamento</a:t>
+            </a:r>
+          </a:p>
+          <a:p>
+            <a:r>
+              <a:rPr lang="it-IT" sz="1800" b="0" i="0" u="none" strike="noStrike" kern="1200" baseline="0" dirty="0" smtClean="0">
                 <a:solidFill>
                   <a:schemeClr val="tx1"/>
                 </a:solidFill>
@@ -1440,12 +1374,12 @@
                 <a:ea typeface="+mn-ea"/>
                 <a:cs typeface="+mn-cs"/>
               </a:rPr>
-              <a:t>la sua maturità. Durante questo periodo iniziale l'ambliopia può essere trattata e</a:t>
-            </a:r>
-          </a:p>
-          <a:p>
-            <a:r>
-              <a:rPr lang="it-IT" sz="1200" b="0" i="0" u="none" strike="noStrike" kern="1200" baseline="0" dirty="0" smtClean="0">
+              <a:t>classico dell'occlusione, è adatto ad un uso domestico, e potrebbe, almeno in parte,</a:t>
+            </a:r>
+          </a:p>
+          <a:p>
+            <a:r>
+              <a:rPr lang="it-IT" sz="1800" b="0" i="0" u="none" strike="noStrike" kern="1200" baseline="0" dirty="0" smtClean="0">
                 <a:solidFill>
                   <a:schemeClr val="tx1"/>
                 </a:solidFill>
@@ -1453,8 +1387,10 @@
                 <a:ea typeface="+mn-ea"/>
                 <a:cs typeface="+mn-cs"/>
               </a:rPr>
-              <a:t>prevenuta, mentre superata questa fase l'istaurazione della malattia diventa</a:t>
-            </a:r>
+              <a:t>sostituire l'occlusione dell'occhio normale.</a:t>
+            </a:r>
+          </a:p>
+          <a:p>
             <a:endParaRPr lang="it-IT" sz="1800" b="0" i="0" u="none" strike="noStrike" kern="1200" baseline="0" dirty="0" smtClean="0">
               <a:solidFill>
                 <a:schemeClr val="tx1"/>
@@ -1464,6 +1400,101 @@
               <a:cs typeface="+mn-cs"/>
             </a:endParaRPr>
           </a:p>
+          <a:p>
+            <a:r>
+              <a:rPr lang="it-IT" sz="1800" b="0" i="0" u="none" strike="noStrike" kern="1200" baseline="0" dirty="0" smtClean="0">
+                <a:solidFill>
+                  <a:schemeClr val="tx1"/>
+                </a:solidFill>
+                <a:latin typeface="+mn-lt"/>
+                <a:ea typeface="+mn-ea"/>
+                <a:cs typeface="+mn-cs"/>
+              </a:rPr>
+              <a:t>L'obiettivo principale di questo progetto di ricerca, denominato 3D4Amb, è di sviluppare</a:t>
+            </a:r>
+          </a:p>
+          <a:p>
+            <a:r>
+              <a:rPr lang="it-IT" sz="1800" b="0" i="0" u="none" strike="noStrike" kern="1200" baseline="0" dirty="0" smtClean="0">
+                <a:solidFill>
+                  <a:schemeClr val="tx1"/>
+                </a:solidFill>
+                <a:latin typeface="+mn-lt"/>
+                <a:ea typeface="+mn-ea"/>
+                <a:cs typeface="+mn-cs"/>
+              </a:rPr>
+              <a:t>un sistema per la diagnosi e il trattamento di ambliopia, basata sulla visione</a:t>
+            </a:r>
+          </a:p>
+          <a:p>
+            <a:r>
+              <a:rPr lang="it-IT" sz="1800" b="0" i="0" u="none" strike="noStrike" kern="1200" baseline="0" dirty="0" smtClean="0">
+                <a:solidFill>
+                  <a:schemeClr val="tx1"/>
+                </a:solidFill>
+                <a:latin typeface="+mn-lt"/>
+                <a:ea typeface="+mn-ea"/>
+                <a:cs typeface="+mn-cs"/>
+              </a:rPr>
+              <a:t>binoculare in modo accessibile. Con il termine accessibile si intende: poco costoso,</a:t>
+            </a:r>
+          </a:p>
+          <a:p>
+            <a:r>
+              <a:rPr lang="it-IT" sz="1800" b="0" i="0" u="none" strike="noStrike" kern="1200" baseline="0" dirty="0" err="1" smtClean="0">
+                <a:solidFill>
+                  <a:schemeClr val="tx1"/>
+                </a:solidFill>
+                <a:latin typeface="+mn-lt"/>
+                <a:ea typeface="+mn-ea"/>
+                <a:cs typeface="+mn-cs"/>
+              </a:rPr>
+              <a:t>user</a:t>
+            </a:r>
+            <a:r>
+              <a:rPr lang="it-IT" sz="1800" b="0" i="0" u="none" strike="noStrike" kern="1200" baseline="0" dirty="0" smtClean="0">
+                <a:solidFill>
+                  <a:schemeClr val="tx1"/>
+                </a:solidFill>
+                <a:latin typeface="+mn-lt"/>
+                <a:ea typeface="+mn-ea"/>
+                <a:cs typeface="+mn-cs"/>
+              </a:rPr>
+              <a:t> </a:t>
+            </a:r>
+            <a:r>
+              <a:rPr lang="it-IT" sz="1800" b="0" i="0" u="none" strike="noStrike" kern="1200" baseline="0" dirty="0" err="1" smtClean="0">
+                <a:solidFill>
+                  <a:schemeClr val="tx1"/>
+                </a:solidFill>
+                <a:latin typeface="+mn-lt"/>
+                <a:ea typeface="+mn-ea"/>
+                <a:cs typeface="+mn-cs"/>
+              </a:rPr>
+              <a:t>friendly</a:t>
+            </a:r>
+            <a:r>
+              <a:rPr lang="it-IT" sz="1800" b="0" i="0" u="none" strike="noStrike" kern="1200" baseline="0" dirty="0" smtClean="0">
+                <a:solidFill>
+                  <a:schemeClr val="tx1"/>
+                </a:solidFill>
+                <a:latin typeface="+mn-lt"/>
+                <a:ea typeface="+mn-ea"/>
+                <a:cs typeface="+mn-cs"/>
+              </a:rPr>
+              <a:t>, adatto per uso domestico e facilmente estendibile.</a:t>
+            </a:r>
+          </a:p>
+          <a:p>
+            <a:endParaRPr lang="it-IT" sz="1800" b="0" i="0" u="none" strike="noStrike" kern="1200" baseline="0" dirty="0" smtClean="0">
+              <a:solidFill>
+                <a:schemeClr val="tx1"/>
+              </a:solidFill>
+              <a:latin typeface="+mn-lt"/>
+              <a:ea typeface="+mn-ea"/>
+              <a:cs typeface="+mn-cs"/>
+            </a:endParaRPr>
+          </a:p>
         </p:txBody>
       </p:sp>
       <p:sp>
@@ -1483,7 +1514,7 @@
           <a:p>
             <a:fld id="{CFA2E487-D896-4E0E-8AAE-B7DEF5C7D479}" type="slidenum">
               <a:rPr lang="it-IT" smtClean="0"/>
-              <a:t>4</a:t>
+              <a:t>3</a:t>
             </a:fld>
             <a:endParaRPr lang="it-IT"/>
           </a:p>
@@ -1492,7 +1523,7 @@
     </p:spTree>
     <p:extLst>
       <p:ext uri="{BB962C8B-B14F-4D97-AF65-F5344CB8AC3E}">
-        <p14:creationId xmlns:p14="http://schemas.microsoft.com/office/powerpoint/2010/main" val="4127611789"/>
+        <p14:creationId xmlns:p14="http://schemas.microsoft.com/office/powerpoint/2010/main" val="4114793006"/>
       </p:ext>
     </p:extLst>
   </p:cSld>
@@ -1729,7 +1760,7 @@
           <a:p>
             <a:fld id="{CFA2E487-D896-4E0E-8AAE-B7DEF5C7D479}" type="slidenum">
               <a:rPr lang="it-IT" smtClean="0"/>
-              <a:t>5</a:t>
+              <a:t>4</a:t>
             </a:fld>
             <a:endParaRPr lang="it-IT"/>
           </a:p>
@@ -1738,7 +1769,7 @@
     </p:spTree>
     <p:extLst>
       <p:ext uri="{BB962C8B-B14F-4D97-AF65-F5344CB8AC3E}">
-        <p14:creationId xmlns:p14="http://schemas.microsoft.com/office/powerpoint/2010/main" val="1768274927"/>
+        <p14:creationId xmlns:p14="http://schemas.microsoft.com/office/powerpoint/2010/main" val="4127611789"/>
       </p:ext>
     </p:extLst>
   </p:cSld>
@@ -1797,6 +1828,156 @@
           <a:bodyPr/>
           <a:lstStyle/>
           <a:p>
+            <a:r>
+              <a:rPr lang="it-IT" sz="1200" b="0" i="0" u="none" strike="noStrike" kern="1200" baseline="0" dirty="0" smtClean="0">
+                <a:solidFill>
+                  <a:schemeClr val="tx1"/>
+                </a:solidFill>
+                <a:latin typeface="+mn-lt"/>
+                <a:ea typeface="+mn-ea"/>
+                <a:cs typeface="+mn-cs"/>
+              </a:rPr>
+              <a:t>le immagini che provengono dagli occhi non vengono correttamente rielaborate all'interno</a:t>
+            </a:r>
+          </a:p>
+          <a:p>
+            <a:r>
+              <a:rPr lang="it-IT" sz="1200" b="0" i="0" u="none" strike="noStrike" kern="1200" baseline="0" dirty="0" smtClean="0">
+                <a:solidFill>
+                  <a:schemeClr val="tx1"/>
+                </a:solidFill>
+                <a:latin typeface="+mn-lt"/>
+                <a:ea typeface="+mn-ea"/>
+                <a:cs typeface="+mn-cs"/>
+              </a:rPr>
+              <a:t>del cervello. Questo causa una scorretta comprensione dello spazio che</a:t>
+            </a:r>
+          </a:p>
+          <a:p>
+            <a:r>
+              <a:rPr lang="it-IT" sz="1200" b="0" i="0" u="none" strike="noStrike" kern="1200" baseline="0" dirty="0" smtClean="0">
+                <a:solidFill>
+                  <a:schemeClr val="tx1"/>
+                </a:solidFill>
+                <a:latin typeface="+mn-lt"/>
+                <a:ea typeface="+mn-ea"/>
+                <a:cs typeface="+mn-cs"/>
+              </a:rPr>
+              <a:t>lo circonda e causa una percezione scorretta della profondità, dei movimenti e dei</a:t>
+            </a:r>
+          </a:p>
+          <a:p>
+            <a:r>
+              <a:rPr lang="it-IT" sz="1200" b="0" i="0" u="none" strike="noStrike" kern="1200" baseline="0" dirty="0" smtClean="0">
+                <a:solidFill>
+                  <a:schemeClr val="tx1"/>
+                </a:solidFill>
+                <a:latin typeface="+mn-lt"/>
+                <a:ea typeface="+mn-ea"/>
+                <a:cs typeface="+mn-cs"/>
+              </a:rPr>
+              <a:t>contrasti. È presente nel 2-4% della popolazione, la sua incidenza è più elevata in</a:t>
+            </a:r>
+          </a:p>
+          <a:p>
+            <a:r>
+              <a:rPr lang="it-IT" sz="1200" b="0" i="0" u="none" strike="noStrike" kern="1200" baseline="0" dirty="0" smtClean="0">
+                <a:solidFill>
+                  <a:schemeClr val="tx1"/>
+                </a:solidFill>
+                <a:latin typeface="+mn-lt"/>
+                <a:ea typeface="+mn-ea"/>
+                <a:cs typeface="+mn-cs"/>
+              </a:rPr>
+              <a:t>associazione con alcune condizioni quali prematurità, sindrome di Down, patologia</a:t>
+            </a:r>
+          </a:p>
+          <a:p>
+            <a:r>
+              <a:rPr lang="it-IT" sz="1200" b="0" i="0" u="none" strike="noStrike" kern="1200" baseline="0" dirty="0" smtClean="0">
+                <a:solidFill>
+                  <a:schemeClr val="tx1"/>
+                </a:solidFill>
+                <a:latin typeface="+mn-lt"/>
+                <a:ea typeface="+mn-ea"/>
+                <a:cs typeface="+mn-cs"/>
+              </a:rPr>
+              <a:t>neurologica e familiarità per ambliopia o strabismo. Spesso le persone non si accorgono</a:t>
+            </a:r>
+          </a:p>
+          <a:p>
+            <a:r>
+              <a:rPr lang="it-IT" sz="1200" b="0" i="0" u="none" strike="noStrike" kern="1200" baseline="0" dirty="0" smtClean="0">
+                <a:solidFill>
+                  <a:schemeClr val="tx1"/>
+                </a:solidFill>
+                <a:latin typeface="+mn-lt"/>
+                <a:ea typeface="+mn-ea"/>
+                <a:cs typeface="+mn-cs"/>
+              </a:rPr>
+              <a:t>di esserne </a:t>
+            </a:r>
+            <a:r>
+              <a:rPr lang="it-IT" sz="1200" b="0" i="0" u="none" strike="noStrike" kern="1200" baseline="0" dirty="0" err="1" smtClean="0">
+                <a:solidFill>
+                  <a:schemeClr val="tx1"/>
+                </a:solidFill>
+                <a:latin typeface="+mn-lt"/>
+                <a:ea typeface="+mn-ea"/>
+                <a:cs typeface="+mn-cs"/>
+              </a:rPr>
+              <a:t>aette</a:t>
+            </a:r>
+            <a:r>
+              <a:rPr lang="it-IT" sz="1200" b="0" i="0" u="none" strike="noStrike" kern="1200" baseline="0" dirty="0" smtClean="0">
+                <a:solidFill>
+                  <a:schemeClr val="tx1"/>
+                </a:solidFill>
+                <a:latin typeface="+mn-lt"/>
+                <a:ea typeface="+mn-ea"/>
+                <a:cs typeface="+mn-cs"/>
+              </a:rPr>
+              <a:t> no ai 20-30 anni, per questo è fondamentale la diagnosi.</a:t>
+            </a:r>
+          </a:p>
+          <a:p>
+            <a:r>
+              <a:rPr lang="it-IT" sz="1200" b="0" i="0" u="none" strike="noStrike" kern="1200" baseline="0" dirty="0" smtClean="0">
+                <a:solidFill>
+                  <a:schemeClr val="tx1"/>
+                </a:solidFill>
+                <a:latin typeface="+mn-lt"/>
+                <a:ea typeface="+mn-ea"/>
+                <a:cs typeface="+mn-cs"/>
+              </a:rPr>
+              <a:t>Può colpire i bambini dalla nascita no ai 7 anni, età in cui il sistema visivo raggiunge</a:t>
+            </a:r>
+          </a:p>
+          <a:p>
+            <a:r>
+              <a:rPr lang="it-IT" sz="1200" b="0" i="0" u="none" strike="noStrike" kern="1200" baseline="0" dirty="0" smtClean="0">
+                <a:solidFill>
+                  <a:schemeClr val="tx1"/>
+                </a:solidFill>
+                <a:latin typeface="+mn-lt"/>
+                <a:ea typeface="+mn-ea"/>
+                <a:cs typeface="+mn-cs"/>
+              </a:rPr>
+              <a:t>la sua maturità. Durante questo periodo iniziale l'ambliopia può essere trattata e</a:t>
+            </a:r>
+          </a:p>
+          <a:p>
+            <a:r>
+              <a:rPr lang="it-IT" sz="1200" b="0" i="0" u="none" strike="noStrike" kern="1200" baseline="0" dirty="0" smtClean="0">
+                <a:solidFill>
+                  <a:schemeClr val="tx1"/>
+                </a:solidFill>
+                <a:latin typeface="+mn-lt"/>
+                <a:ea typeface="+mn-ea"/>
+                <a:cs typeface="+mn-cs"/>
+              </a:rPr>
+              <a:t>prevenuta, mentre superata questa fase l'istaurazione della malattia diventa</a:t>
+            </a:r>
             <a:endParaRPr lang="it-IT" sz="1800" b="0" i="0" u="none" strike="noStrike" kern="1200" baseline="0" dirty="0" smtClean="0">
               <a:solidFill>
                 <a:schemeClr val="tx1"/>
@@ -1825,7 +2006,7 @@
           <a:p>
             <a:fld id="{CFA2E487-D896-4E0E-8AAE-B7DEF5C7D479}" type="slidenum">
               <a:rPr lang="it-IT" smtClean="0"/>
-              <a:t>6</a:t>
+              <a:t>5</a:t>
             </a:fld>
             <a:endParaRPr lang="it-IT"/>
           </a:p>
@@ -1834,7 +2015,7 @@
     </p:spTree>
     <p:extLst>
       <p:ext uri="{BB962C8B-B14F-4D97-AF65-F5344CB8AC3E}">
-        <p14:creationId xmlns:p14="http://schemas.microsoft.com/office/powerpoint/2010/main" val="3408452420"/>
+        <p14:creationId xmlns:p14="http://schemas.microsoft.com/office/powerpoint/2010/main" val="1768274927"/>
       </p:ext>
     </p:extLst>
   </p:cSld>
@@ -1921,7 +2102,7 @@
           <a:p>
             <a:fld id="{CFA2E487-D896-4E0E-8AAE-B7DEF5C7D479}" type="slidenum">
               <a:rPr lang="it-IT" smtClean="0"/>
-              <a:t>7</a:t>
+              <a:t>6</a:t>
             </a:fld>
             <a:endParaRPr lang="it-IT"/>
           </a:p>
@@ -1930,7 +2111,7 @@
     </p:spTree>
     <p:extLst>
       <p:ext uri="{BB962C8B-B14F-4D97-AF65-F5344CB8AC3E}">
-        <p14:creationId xmlns:p14="http://schemas.microsoft.com/office/powerpoint/2010/main" val="1407974086"/>
+        <p14:creationId xmlns:p14="http://schemas.microsoft.com/office/powerpoint/2010/main" val="3408452420"/>
       </p:ext>
     </p:extLst>
   </p:cSld>
@@ -2017,7 +2198,7 @@
           <a:p>
             <a:fld id="{CFA2E487-D896-4E0E-8AAE-B7DEF5C7D479}" type="slidenum">
               <a:rPr lang="it-IT" smtClean="0"/>
-              <a:t>8</a:t>
+              <a:t>7</a:t>
             </a:fld>
             <a:endParaRPr lang="it-IT"/>
           </a:p>
@@ -2026,7 +2207,7 @@
     </p:spTree>
     <p:extLst>
       <p:ext uri="{BB962C8B-B14F-4D97-AF65-F5344CB8AC3E}">
-        <p14:creationId xmlns:p14="http://schemas.microsoft.com/office/powerpoint/2010/main" val="3353859669"/>
+        <p14:creationId xmlns:p14="http://schemas.microsoft.com/office/powerpoint/2010/main" val="1407974086"/>
       </p:ext>
     </p:extLst>
   </p:cSld>
@@ -2113,7 +2294,7 @@
           <a:p>
             <a:fld id="{CFA2E487-D896-4E0E-8AAE-B7DEF5C7D479}" type="slidenum">
               <a:rPr lang="it-IT" smtClean="0"/>
-              <a:t>9</a:t>
+              <a:t>8</a:t>
             </a:fld>
             <a:endParaRPr lang="it-IT"/>
           </a:p>
@@ -2122,7 +2303,7 @@
     </p:spTree>
     <p:extLst>
       <p:ext uri="{BB962C8B-B14F-4D97-AF65-F5344CB8AC3E}">
-        <p14:creationId xmlns:p14="http://schemas.microsoft.com/office/powerpoint/2010/main" val="1224432353"/>
+        <p14:creationId xmlns:p14="http://schemas.microsoft.com/office/powerpoint/2010/main" val="3353859669"/>
       </p:ext>
     </p:extLst>
   </p:cSld>
@@ -2209,7 +2390,7 @@
           <a:p>
             <a:fld id="{CFA2E487-D896-4E0E-8AAE-B7DEF5C7D479}" type="slidenum">
               <a:rPr lang="it-IT" smtClean="0"/>
-              <a:t>10</a:t>
+              <a:t>9</a:t>
             </a:fld>
             <a:endParaRPr lang="it-IT"/>
           </a:p>
@@ -2218,7 +2399,7 @@
     </p:spTree>
     <p:extLst>
       <p:ext uri="{BB962C8B-B14F-4D97-AF65-F5344CB8AC3E}">
-        <p14:creationId xmlns:p14="http://schemas.microsoft.com/office/powerpoint/2010/main" val="2705236575"/>
+        <p14:creationId xmlns:p14="http://schemas.microsoft.com/office/powerpoint/2010/main" val="1224432353"/>
       </p:ext>
     </p:extLst>
   </p:cSld>
@@ -2359,7 +2540,7 @@
           <a:p>
             <a:fld id="{B6E0B508-B881-48D4-821F-B26A9B79B3A3}" type="datetime1">
               <a:rPr lang="it-IT" smtClean="0"/>
-              <a:t>12/09/2015</a:t>
+              <a:t>13/09/2015</a:t>
             </a:fld>
             <a:endParaRPr lang="it-IT"/>
           </a:p>
@@ -2533,7 +2714,7 @@
           <a:p>
             <a:fld id="{545E7D00-0C8E-496B-868A-D9493DABF12A}" type="datetime1">
               <a:rPr lang="it-IT" smtClean="0"/>
-              <a:t>12/09/2015</a:t>
+              <a:t>13/09/2015</a:t>
             </a:fld>
             <a:endParaRPr lang="it-IT"/>
           </a:p>
@@ -2717,7 +2898,7 @@
           <a:p>
             <a:fld id="{8E2F48DD-6D73-4E6A-8EC2-7153CF7C39F2}" type="datetime1">
               <a:rPr lang="it-IT" smtClean="0"/>
-              <a:t>12/09/2015</a:t>
+              <a:t>13/09/2015</a:t>
             </a:fld>
             <a:endParaRPr lang="it-IT"/>
           </a:p>
@@ -2892,7 +3073,7 @@
           <a:p>
             <a:fld id="{983F8A9F-C710-45FD-AB35-78C2F839272B}" type="datetime1">
               <a:rPr lang="it-IT" smtClean="0"/>
-              <a:t>12/09/2015</a:t>
+              <a:t>13/09/2015</a:t>
             </a:fld>
             <a:endParaRPr lang="it-IT"/>
           </a:p>
@@ -3140,7 +3321,7 @@
           <a:p>
             <a:fld id="{9B464FB8-12C8-4D66-8BC8-12E032A671B0}" type="datetime1">
               <a:rPr lang="it-IT" smtClean="0"/>
-              <a:t>12/09/2015</a:t>
+              <a:t>13/09/2015</a:t>
             </a:fld>
             <a:endParaRPr lang="it-IT"/>
           </a:p>
@@ -3376,7 +3557,7 @@
           <a:p>
             <a:fld id="{81A4ECBC-51E7-4B1D-AAB5-8994720AB72C}" type="datetime1">
               <a:rPr lang="it-IT" smtClean="0"/>
-              <a:t>12/09/2015</a:t>
+              <a:t>13/09/2015</a:t>
             </a:fld>
             <a:endParaRPr lang="it-IT"/>
           </a:p>
@@ -3747,7 +3928,7 @@
           <a:p>
             <a:fld id="{E56DF166-8581-411D-A5E4-5D293DDC1382}" type="datetime1">
               <a:rPr lang="it-IT" smtClean="0"/>
-              <a:t>12/09/2015</a:t>
+              <a:t>13/09/2015</a:t>
             </a:fld>
             <a:endParaRPr lang="it-IT"/>
           </a:p>
@@ -3869,7 +4050,7 @@
           <a:p>
             <a:fld id="{BC186AF0-FDBB-4A9A-A1FA-DAE9933BF9AF}" type="datetime1">
               <a:rPr lang="it-IT" smtClean="0"/>
-              <a:t>12/09/2015</a:t>
+              <a:t>13/09/2015</a:t>
             </a:fld>
             <a:endParaRPr lang="it-IT"/>
           </a:p>
@@ -3968,7 +4149,7 @@
           <a:p>
             <a:fld id="{DD35B7E5-4546-4F7B-BEE8-CB19004121FB}" type="datetime1">
               <a:rPr lang="it-IT" smtClean="0"/>
-              <a:t>12/09/2015</a:t>
+              <a:t>13/09/2015</a:t>
             </a:fld>
             <a:endParaRPr lang="it-IT"/>
           </a:p>
@@ -4249,7 +4430,7 @@
           <a:p>
             <a:fld id="{50A02FB4-091F-4DFA-BF35-ED3D039280B7}" type="datetime1">
               <a:rPr lang="it-IT" smtClean="0"/>
-              <a:t>12/09/2015</a:t>
+              <a:t>13/09/2015</a:t>
             </a:fld>
             <a:endParaRPr lang="it-IT"/>
           </a:p>
@@ -4510,7 +4691,7 @@
           <a:p>
             <a:fld id="{5C6E9F36-295A-42C0-BFD2-99935AC5EFFF}" type="datetime1">
               <a:rPr lang="it-IT" smtClean="0"/>
-              <a:t>12/09/2015</a:t>
+              <a:t>13/09/2015</a:t>
             </a:fld>
             <a:endParaRPr lang="it-IT"/>
           </a:p>
@@ -4727,7 +4908,7 @@
           <a:p>
             <a:fld id="{8E2F48DD-6D73-4E6A-8EC2-7153CF7C39F2}" type="datetime1">
               <a:rPr lang="it-IT" smtClean="0"/>
-              <a:t>12/09/2015</a:t>
+              <a:t>13/09/2015</a:t>
             </a:fld>
             <a:endParaRPr lang="it-IT"/>
           </a:p>
@@ -5223,7 +5404,7 @@
           <p:nvPr/>
         </p:nvPicPr>
         <p:blipFill>
-          <a:blip r:embed="rId2" cstate="print">
+          <a:blip r:embed="rId3" cstate="print">
             <a:extLst>
               <a:ext uri="{28A0092B-C50C-407E-A947-70E740481C1C}">
                 <a14:useLocalDpi xmlns:a14="http://schemas.microsoft.com/office/drawing/2010/main" val="0"/>
@@ -5496,6 +5677,14 @@
   <p:clrMapOvr>
     <a:masterClrMapping/>
   </p:clrMapOvr>
+  <mc:AlternateContent xmlns:mc="http://schemas.openxmlformats.org/markup-compatibility/2006">
+    <mc:Choice xmlns:p14="http://schemas.microsoft.com/office/powerpoint/2010/main" Requires="p14">
+      <p:transition p14:dur="0"/>
+    </mc:Choice>
+    <mc:Fallback>
+      <p:transition/>
+    </mc:Fallback>
+  </mc:AlternateContent>
   <p:timing>
     <p:tnLst>
       <p:par>
@@ -5940,6 +6129,14 @@
   <p:clrMapOvr>
     <a:masterClrMapping/>
   </p:clrMapOvr>
+  <mc:AlternateContent xmlns:mc="http://schemas.openxmlformats.org/markup-compatibility/2006">
+    <mc:Choice xmlns:p14="http://schemas.microsoft.com/office/powerpoint/2010/main" Requires="p14">
+      <p:transition p14:dur="0"/>
+    </mc:Choice>
+    <mc:Fallback>
+      <p:transition/>
+    </mc:Fallback>
+  </mc:AlternateContent>
   <p:timing>
     <p:tnLst>
       <p:par>
@@ -6658,9 +6855,14 @@
   <p:clrMapOvr>
     <a:masterClrMapping/>
   </p:clrMapOvr>
-  <p:transition spd="slow">
-    <p:cover/>
-  </p:transition>
+  <mc:AlternateContent xmlns:mc="http://schemas.openxmlformats.org/markup-compatibility/2006">
+    <mc:Choice xmlns:p14="http://schemas.microsoft.com/office/powerpoint/2010/main" Requires="p14">
+      <p:transition p14:dur="0"/>
+    </mc:Choice>
+    <mc:Fallback>
+      <p:transition/>
+    </mc:Fallback>
+  </mc:AlternateContent>
   <p:timing>
     <p:tnLst>
       <p:par>
@@ -7652,6 +7854,318 @@
 </p:sld>
 </file>
 
+<file path=ppt/slides/slide12.xml><?xml version="1.0" encoding="utf-8"?>
+<p:sld xmlns:a="http://schemas.openxmlformats.org/drawingml/2006/main" xmlns:r="http://schemas.openxmlformats.org/officeDocument/2006/relationships" xmlns:p="http://schemas.openxmlformats.org/presentationml/2006/main">
+  <p:cSld>
+    <p:spTree>
+      <p:nvGrpSpPr>
+        <p:cNvPr id="1" name=""/>
+        <p:cNvGrpSpPr/>
+        <p:nvPr/>
+      </p:nvGrpSpPr>
+      <p:grpSpPr>
+        <a:xfrm>
+          <a:off x="0" y="0"/>
+          <a:ext cx="0" cy="0"/>
+          <a:chOff x="0" y="0"/>
+          <a:chExt cx="0" cy="0"/>
+        </a:xfrm>
+      </p:grpSpPr>
+      <p:cxnSp>
+        <p:nvCxnSpPr>
+          <p:cNvPr id="3" name="Connettore 1 2"/>
+          <p:cNvCxnSpPr/>
+          <p:nvPr/>
+        </p:nvCxnSpPr>
+        <p:spPr>
+          <a:xfrm>
+            <a:off x="0" y="999754"/>
+            <a:ext cx="9144000" cy="0"/>
+          </a:xfrm>
+          <a:prstGeom prst="line">
+            <a:avLst/>
+          </a:prstGeom>
+          <a:ln>
+            <a:solidFill>
+              <a:srgbClr val="044F92"/>
+            </a:solidFill>
+          </a:ln>
+        </p:spPr>
+        <p:style>
+          <a:lnRef idx="1">
+            <a:schemeClr val="accent1"/>
+          </a:lnRef>
+          <a:fillRef idx="0">
+            <a:schemeClr val="accent1"/>
+          </a:fillRef>
+          <a:effectRef idx="0">
+            <a:schemeClr val="accent1"/>
+          </a:effectRef>
+          <a:fontRef idx="minor">
+            <a:schemeClr val="tx1"/>
+          </a:fontRef>
+        </p:style>
+      </p:cxnSp>
+      <p:sp>
+        <p:nvSpPr>
+          <p:cNvPr id="5" name="Rettangolo 4"/>
+          <p:cNvSpPr/>
+          <p:nvPr/>
+        </p:nvSpPr>
+        <p:spPr>
+          <a:xfrm>
+            <a:off x="0" y="6432012"/>
+            <a:ext cx="9144000" cy="449778"/>
+          </a:xfrm>
+          <a:prstGeom prst="rect">
+            <a:avLst/>
+          </a:prstGeom>
+          <a:solidFill>
+            <a:srgbClr val="044F92"/>
+          </a:solidFill>
+        </p:spPr>
+        <p:style>
+          <a:lnRef idx="2">
+            <a:schemeClr val="accent1">
+              <a:shade val="50000"/>
+            </a:schemeClr>
+          </a:lnRef>
+          <a:fillRef idx="1">
+            <a:schemeClr val="accent1"/>
+          </a:fillRef>
+          <a:effectRef idx="0">
+            <a:schemeClr val="accent1"/>
+          </a:effectRef>
+          <a:fontRef idx="minor">
+            <a:schemeClr val="lt1"/>
+          </a:fontRef>
+        </p:style>
+        <p:txBody>
+          <a:bodyPr rtlCol="0" anchor="ctr"/>
+          <a:lstStyle/>
+          <a:p>
+            <a:pPr algn="ctr"/>
+            <a:endParaRPr lang="it-IT" sz="1350" dirty="0"/>
+          </a:p>
+        </p:txBody>
+      </p:sp>
+      <p:sp>
+        <p:nvSpPr>
+          <p:cNvPr id="6" name="CasellaDiTesto 5"/>
+          <p:cNvSpPr txBox="1"/>
+          <p:nvPr/>
+        </p:nvSpPr>
+        <p:spPr>
+          <a:xfrm>
+            <a:off x="124691" y="6518401"/>
+            <a:ext cx="2275944" cy="300082"/>
+          </a:xfrm>
+          <a:prstGeom prst="rect">
+            <a:avLst/>
+          </a:prstGeom>
+          <a:noFill/>
+        </p:spPr>
+        <p:txBody>
+          <a:bodyPr wrap="none" rtlCol="0">
+            <a:spAutoFit/>
+          </a:bodyPr>
+          <a:lstStyle/>
+          <a:p>
+            <a:r>
+              <a:rPr lang="it-IT" sz="1350" dirty="0" smtClean="0">
+                <a:solidFill>
+                  <a:schemeClr val="bg1"/>
+                </a:solidFill>
+                <a:latin typeface="Cambria" panose="02040503050406030204" pitchFamily="18" charset="0"/>
+              </a:rPr>
+              <a:t>Fabio Terzi, Matteo Zambelli</a:t>
+            </a:r>
+            <a:endParaRPr lang="it-IT" sz="1350" dirty="0">
+              <a:solidFill>
+                <a:schemeClr val="bg1"/>
+              </a:solidFill>
+              <a:latin typeface="Cambria" panose="02040503050406030204" pitchFamily="18" charset="0"/>
+            </a:endParaRPr>
+          </a:p>
+        </p:txBody>
+      </p:sp>
+      <p:pic>
+        <p:nvPicPr>
+          <p:cNvPr id="8" name="Immagine 7"/>
+          <p:cNvPicPr>
+            <a:picLocks noChangeAspect="1"/>
+          </p:cNvPicPr>
+          <p:nvPr/>
+        </p:nvPicPr>
+        <p:blipFill>
+          <a:blip r:embed="rId3" cstate="print">
+            <a:extLst>
+              <a:ext uri="{28A0092B-C50C-407E-A947-70E740481C1C}">
+                <a14:useLocalDpi xmlns:a14="http://schemas.microsoft.com/office/drawing/2010/main" val="0"/>
+              </a:ext>
+            </a:extLst>
+          </a:blip>
+          <a:stretch>
+            <a:fillRect/>
+          </a:stretch>
+        </p:blipFill>
+        <p:spPr>
+          <a:xfrm>
+            <a:off x="7842029" y="6476543"/>
+            <a:ext cx="1087642" cy="363389"/>
+          </a:xfrm>
+          <a:prstGeom prst="rect">
+            <a:avLst/>
+          </a:prstGeom>
+        </p:spPr>
+      </p:pic>
+      <p:sp>
+        <p:nvSpPr>
+          <p:cNvPr id="10" name="Rettangolo 9"/>
+          <p:cNvSpPr/>
+          <p:nvPr/>
+        </p:nvSpPr>
+        <p:spPr>
+          <a:xfrm>
+            <a:off x="176081" y="1895564"/>
+            <a:ext cx="8715915" cy="923330"/>
+          </a:xfrm>
+          <a:prstGeom prst="rect">
+            <a:avLst/>
+          </a:prstGeom>
+        </p:spPr>
+        <p:txBody>
+          <a:bodyPr wrap="square">
+            <a:spAutoFit/>
+          </a:bodyPr>
+          <a:lstStyle/>
+          <a:p>
+            <a:pPr marL="257175" indent="-257175" algn="just">
+              <a:buFont typeface="Arial" panose="020B0604020202020204" pitchFamily="34" charset="0"/>
+              <a:buChar char="•"/>
+            </a:pPr>
+            <a:endParaRPr lang="it-IT" dirty="0">
+              <a:latin typeface="Cambria" panose="02040503050406030204" pitchFamily="18" charset="0"/>
+            </a:endParaRPr>
+          </a:p>
+          <a:p>
+            <a:pPr marL="257175" indent="-257175" algn="just">
+              <a:buFont typeface="Arial" panose="020B0604020202020204" pitchFamily="34" charset="0"/>
+              <a:buChar char="•"/>
+            </a:pPr>
+            <a:endParaRPr lang="it-IT" dirty="0">
+              <a:latin typeface="Cambria" panose="02040503050406030204" pitchFamily="18" charset="0"/>
+            </a:endParaRPr>
+          </a:p>
+          <a:p>
+            <a:pPr marL="257175" indent="-257175" algn="just">
+              <a:buFont typeface="Arial" panose="020B0604020202020204" pitchFamily="34" charset="0"/>
+              <a:buChar char="•"/>
+            </a:pPr>
+            <a:endParaRPr lang="it-IT" dirty="0">
+              <a:latin typeface="Cambria" panose="02040503050406030204" pitchFamily="18" charset="0"/>
+            </a:endParaRPr>
+          </a:p>
+        </p:txBody>
+      </p:sp>
+      <p:sp>
+        <p:nvSpPr>
+          <p:cNvPr id="11" name="CasellaDiTesto 10"/>
+          <p:cNvSpPr txBox="1"/>
+          <p:nvPr/>
+        </p:nvSpPr>
+        <p:spPr>
+          <a:xfrm>
+            <a:off x="285007" y="190005"/>
+            <a:ext cx="9348850" cy="600164"/>
+          </a:xfrm>
+          <a:prstGeom prst="rect">
+            <a:avLst/>
+          </a:prstGeom>
+          <a:noFill/>
+        </p:spPr>
+        <p:txBody>
+          <a:bodyPr wrap="square" rtlCol="0">
+            <a:spAutoFit/>
+          </a:bodyPr>
+          <a:lstStyle/>
+          <a:p>
+            <a:r>
+              <a:rPr lang="it-IT" sz="3300" dirty="0" smtClean="0">
+                <a:solidFill>
+                  <a:srgbClr val="044F92"/>
+                </a:solidFill>
+                <a:latin typeface="Cambria" panose="02040503050406030204" pitchFamily="18" charset="0"/>
+              </a:rPr>
+              <a:t>ARCHITETTURA DI SISTEMA</a:t>
+            </a:r>
+            <a:endParaRPr lang="it-IT" sz="3300" dirty="0">
+              <a:solidFill>
+                <a:srgbClr val="044F92"/>
+              </a:solidFill>
+              <a:latin typeface="Cambria" panose="02040503050406030204" pitchFamily="18" charset="0"/>
+            </a:endParaRPr>
+          </a:p>
+        </p:txBody>
+      </p:sp>
+      <p:pic>
+        <p:nvPicPr>
+          <p:cNvPr id="16" name="Immagine 15"/>
+          <p:cNvPicPr>
+            <a:picLocks noChangeAspect="1"/>
+          </p:cNvPicPr>
+          <p:nvPr/>
+        </p:nvPicPr>
+        <p:blipFill>
+          <a:blip r:embed="rId4" cstate="print">
+            <a:extLst>
+              <a:ext uri="{28A0092B-C50C-407E-A947-70E740481C1C}">
+                <a14:useLocalDpi xmlns:a14="http://schemas.microsoft.com/office/drawing/2010/main" val="0"/>
+              </a:ext>
+            </a:extLst>
+          </a:blip>
+          <a:stretch>
+            <a:fillRect/>
+          </a:stretch>
+        </p:blipFill>
+        <p:spPr>
+          <a:xfrm>
+            <a:off x="466520" y="1765300"/>
+            <a:ext cx="8349611" cy="3210055"/>
+          </a:xfrm>
+          <a:prstGeom prst="rect">
+            <a:avLst/>
+          </a:prstGeom>
+        </p:spPr>
+      </p:pic>
+    </p:spTree>
+    <p:extLst>
+      <p:ext uri="{BB962C8B-B14F-4D97-AF65-F5344CB8AC3E}">
+        <p14:creationId xmlns:p14="http://schemas.microsoft.com/office/powerpoint/2010/main" val="941579009"/>
+      </p:ext>
+    </p:extLst>
+  </p:cSld>
+  <p:clrMapOvr>
+    <a:masterClrMapping/>
+  </p:clrMapOvr>
+  <mc:AlternateContent xmlns:mc="http://schemas.openxmlformats.org/markup-compatibility/2006">
+    <mc:Choice xmlns:p14="http://schemas.microsoft.com/office/powerpoint/2010/main" Requires="p14">
+      <p:transition p14:dur="0"/>
+    </mc:Choice>
+    <mc:Fallback>
+      <p:transition/>
+    </mc:Fallback>
+  </mc:AlternateContent>
+  <p:timing>
+    <p:tnLst>
+      <p:par>
+        <p:cTn id="1" dur="indefinite" restart="never" nodeType="tmRoot"/>
+      </p:par>
+    </p:tnLst>
+  </p:timing>
+</p:sld>
+</file>
+
 <file path=ppt/slides/slide2.xml><?xml version="1.0" encoding="utf-8"?>
 <p:sld xmlns:a="http://schemas.openxmlformats.org/drawingml/2006/main" xmlns:r="http://schemas.openxmlformats.org/officeDocument/2006/relationships" xmlns:p="http://schemas.openxmlformats.org/presentationml/2006/main">
   <p:cSld>
@@ -8147,6 +8661,14 @@
   <p:clrMapOvr>
     <a:masterClrMapping/>
   </p:clrMapOvr>
+  <mc:AlternateContent xmlns:mc="http://schemas.openxmlformats.org/markup-compatibility/2006">
+    <mc:Choice xmlns:p14="http://schemas.microsoft.com/office/powerpoint/2010/main" Requires="p14">
+      <p:transition p14:dur="0"/>
+    </mc:Choice>
+    <mc:Fallback>
+      <p:transition/>
+    </mc:Fallback>
+  </mc:AlternateContent>
   <p:timing>
     <p:tnLst>
       <p:par>
@@ -8695,6 +9217,14 @@
   <p:clrMapOvr>
     <a:masterClrMapping/>
   </p:clrMapOvr>
+  <mc:AlternateContent xmlns:mc="http://schemas.openxmlformats.org/markup-compatibility/2006">
+    <mc:Choice xmlns:p14="http://schemas.microsoft.com/office/powerpoint/2010/main" Requires="p14">
+      <p:transition p14:dur="0"/>
+    </mc:Choice>
+    <mc:Fallback>
+      <p:transition/>
+    </mc:Fallback>
+  </mc:AlternateContent>
   <p:timing>
     <p:tnLst>
       <p:par>
@@ -9252,6 +9782,14 @@
   <p:clrMapOvr>
     <a:masterClrMapping/>
   </p:clrMapOvr>
+  <mc:AlternateContent xmlns:mc="http://schemas.openxmlformats.org/markup-compatibility/2006">
+    <mc:Choice xmlns:p14="http://schemas.microsoft.com/office/powerpoint/2010/main" Requires="p14">
+      <p:transition p14:dur="0"/>
+    </mc:Choice>
+    <mc:Fallback>
+      <p:transition/>
+    </mc:Fallback>
+  </mc:AlternateContent>
   <p:timing>
     <p:tnLst>
       <p:par>
@@ -9794,6 +10332,14 @@
   <p:clrMapOvr>
     <a:masterClrMapping/>
   </p:clrMapOvr>
+  <mc:AlternateContent xmlns:mc="http://schemas.openxmlformats.org/markup-compatibility/2006">
+    <mc:Choice xmlns:p14="http://schemas.microsoft.com/office/powerpoint/2010/main" Requires="p14">
+      <p:transition p14:dur="0"/>
+    </mc:Choice>
+    <mc:Fallback>
+      <p:transition/>
+    </mc:Fallback>
+  </mc:AlternateContent>
   <p:timing>
     <p:tnLst>
       <p:par>
@@ -10261,6 +10807,14 @@
   <p:clrMapOvr>
     <a:masterClrMapping/>
   </p:clrMapOvr>
+  <mc:AlternateContent xmlns:mc="http://schemas.openxmlformats.org/markup-compatibility/2006">
+    <mc:Choice xmlns:p14="http://schemas.microsoft.com/office/powerpoint/2010/main" Requires="p14">
+      <p:transition p14:dur="0"/>
+    </mc:Choice>
+    <mc:Fallback>
+      <p:transition/>
+    </mc:Fallback>
+  </mc:AlternateContent>
   <p:timing>
     <p:tnLst>
       <p:par>
@@ -10565,6 +11119,14 @@
   <p:clrMapOvr>
     <a:masterClrMapping/>
   </p:clrMapOvr>
+  <mc:AlternateContent xmlns:mc="http://schemas.openxmlformats.org/markup-compatibility/2006">
+    <mc:Choice xmlns:p14="http://schemas.microsoft.com/office/powerpoint/2010/main" Requires="p14">
+      <p:transition p14:dur="0"/>
+    </mc:Choice>
+    <mc:Fallback>
+      <p:transition/>
+    </mc:Fallback>
+  </mc:AlternateContent>
   <p:timing>
     <p:tnLst>
       <p:par>
@@ -11117,6 +11679,14 @@
   <p:clrMapOvr>
     <a:masterClrMapping/>
   </p:clrMapOvr>
+  <mc:AlternateContent xmlns:mc="http://schemas.openxmlformats.org/markup-compatibility/2006">
+    <mc:Choice xmlns:p14="http://schemas.microsoft.com/office/powerpoint/2010/main" Requires="p14">
+      <p:transition p14:dur="0"/>
+    </mc:Choice>
+    <mc:Fallback>
+      <p:transition/>
+    </mc:Fallback>
+  </mc:AlternateContent>
   <p:timing>
     <p:tnLst>
       <p:par>
@@ -11624,6 +12194,14 @@
   <p:clrMapOvr>
     <a:masterClrMapping/>
   </p:clrMapOvr>
+  <mc:AlternateContent xmlns:mc="http://schemas.openxmlformats.org/markup-compatibility/2006">
+    <mc:Choice xmlns:p14="http://schemas.microsoft.com/office/powerpoint/2010/main" Requires="p14">
+      <p:transition p14:dur="0"/>
+    </mc:Choice>
+    <mc:Fallback>
+      <p:transition/>
+    </mc:Fallback>
+  </mc:AlternateContent>
   <p:timing>
     <p:tnLst>
       <p:par>

</xml_diff>